<commit_message>
mejora en colores, fondos y estandarizacion de css en archivo global.css
</commit_message>
<xml_diff>
--- a/multimedia/img/editable-portada-ministerio-de-restauracion-jesucristo-vive.pptx
+++ b/multimedia/img/editable-portada-ministerio-de-restauracion-jesucristo-vive.pptx
@@ -7,6 +7,7 @@
   <p:sldIdLst>
     <p:sldId id="256" r:id="rId2"/>
     <p:sldId id="259" r:id="rId3"/>
+    <p:sldId id="260" r:id="rId4"/>
   </p:sldIdLst>
   <p:sldSz cx="35999738" cy="8388350"/>
   <p:notesSz cx="6858000" cy="9144000"/>
@@ -244,7 +245,7 @@
           <a:p>
             <a:fld id="{7BA6A469-F0B3-4C64-9911-14D3A4F0D9D6}" type="datetimeFigureOut">
               <a:rPr lang="es-419" smtClean="0"/>
-              <a:t>13/2/2026</a:t>
+              <a:t>14/2/2026</a:t>
             </a:fld>
             <a:endParaRPr lang="es-419"/>
           </a:p>
@@ -414,7 +415,7 @@
           <a:p>
             <a:fld id="{7BA6A469-F0B3-4C64-9911-14D3A4F0D9D6}" type="datetimeFigureOut">
               <a:rPr lang="es-419" smtClean="0"/>
-              <a:t>13/2/2026</a:t>
+              <a:t>14/2/2026</a:t>
             </a:fld>
             <a:endParaRPr lang="es-419"/>
           </a:p>
@@ -594,7 +595,7 @@
           <a:p>
             <a:fld id="{7BA6A469-F0B3-4C64-9911-14D3A4F0D9D6}" type="datetimeFigureOut">
               <a:rPr lang="es-419" smtClean="0"/>
-              <a:t>13/2/2026</a:t>
+              <a:t>14/2/2026</a:t>
             </a:fld>
             <a:endParaRPr lang="es-419"/>
           </a:p>
@@ -764,7 +765,7 @@
           <a:p>
             <a:fld id="{7BA6A469-F0B3-4C64-9911-14D3A4F0D9D6}" type="datetimeFigureOut">
               <a:rPr lang="es-419" smtClean="0"/>
-              <a:t>13/2/2026</a:t>
+              <a:t>14/2/2026</a:t>
             </a:fld>
             <a:endParaRPr lang="es-419"/>
           </a:p>
@@ -1010,7 +1011,7 @@
           <a:p>
             <a:fld id="{7BA6A469-F0B3-4C64-9911-14D3A4F0D9D6}" type="datetimeFigureOut">
               <a:rPr lang="es-419" smtClean="0"/>
-              <a:t>13/2/2026</a:t>
+              <a:t>14/2/2026</a:t>
             </a:fld>
             <a:endParaRPr lang="es-419"/>
           </a:p>
@@ -1242,7 +1243,7 @@
           <a:p>
             <a:fld id="{7BA6A469-F0B3-4C64-9911-14D3A4F0D9D6}" type="datetimeFigureOut">
               <a:rPr lang="es-419" smtClean="0"/>
-              <a:t>13/2/2026</a:t>
+              <a:t>14/2/2026</a:t>
             </a:fld>
             <a:endParaRPr lang="es-419"/>
           </a:p>
@@ -1609,7 +1610,7 @@
           <a:p>
             <a:fld id="{7BA6A469-F0B3-4C64-9911-14D3A4F0D9D6}" type="datetimeFigureOut">
               <a:rPr lang="es-419" smtClean="0"/>
-              <a:t>13/2/2026</a:t>
+              <a:t>14/2/2026</a:t>
             </a:fld>
             <a:endParaRPr lang="es-419"/>
           </a:p>
@@ -1727,7 +1728,7 @@
           <a:p>
             <a:fld id="{7BA6A469-F0B3-4C64-9911-14D3A4F0D9D6}" type="datetimeFigureOut">
               <a:rPr lang="es-419" smtClean="0"/>
-              <a:t>13/2/2026</a:t>
+              <a:t>14/2/2026</a:t>
             </a:fld>
             <a:endParaRPr lang="es-419"/>
           </a:p>
@@ -1822,7 +1823,7 @@
           <a:p>
             <a:fld id="{7BA6A469-F0B3-4C64-9911-14D3A4F0D9D6}" type="datetimeFigureOut">
               <a:rPr lang="es-419" smtClean="0"/>
-              <a:t>13/2/2026</a:t>
+              <a:t>14/2/2026</a:t>
             </a:fld>
             <a:endParaRPr lang="es-419"/>
           </a:p>
@@ -2099,7 +2100,7 @@
           <a:p>
             <a:fld id="{7BA6A469-F0B3-4C64-9911-14D3A4F0D9D6}" type="datetimeFigureOut">
               <a:rPr lang="es-419" smtClean="0"/>
-              <a:t>13/2/2026</a:t>
+              <a:t>14/2/2026</a:t>
             </a:fld>
             <a:endParaRPr lang="es-419"/>
           </a:p>
@@ -2356,7 +2357,7 @@
           <a:p>
             <a:fld id="{7BA6A469-F0B3-4C64-9911-14D3A4F0D9D6}" type="datetimeFigureOut">
               <a:rPr lang="es-419" smtClean="0"/>
-              <a:t>13/2/2026</a:t>
+              <a:t>14/2/2026</a:t>
             </a:fld>
             <a:endParaRPr lang="es-419"/>
           </a:p>
@@ -2569,7 +2570,7 @@
           <a:p>
             <a:fld id="{7BA6A469-F0B3-4C64-9911-14D3A4F0D9D6}" type="datetimeFigureOut">
               <a:rPr lang="es-419" smtClean="0"/>
-              <a:t>13/2/2026</a:t>
+              <a:t>14/2/2026</a:t>
             </a:fld>
             <a:endParaRPr lang="es-419"/>
           </a:p>
@@ -3538,6 +3539,185 @@
 </p:sld>
 </file>
 
+<file path=ppt/slides/slide3.xml><?xml version="1.0" encoding="utf-8"?>
+<p:sld xmlns:a="http://schemas.openxmlformats.org/drawingml/2006/main" xmlns:r="http://schemas.openxmlformats.org/officeDocument/2006/relationships" xmlns:p="http://schemas.openxmlformats.org/presentationml/2006/main">
+  <p:cSld>
+    <p:spTree>
+      <p:nvGrpSpPr>
+        <p:cNvPr id="1" name="">
+          <a:extLst>
+            <a:ext uri="{FF2B5EF4-FFF2-40B4-BE49-F238E27FC236}">
+              <a16:creationId xmlns:a16="http://schemas.microsoft.com/office/drawing/2014/main" id="{86740589-862D-C472-24C7-10FB3CF2154A}"/>
+            </a:ext>
+          </a:extLst>
+        </p:cNvPr>
+        <p:cNvGrpSpPr/>
+        <p:nvPr/>
+      </p:nvGrpSpPr>
+      <p:grpSpPr>
+        <a:xfrm>
+          <a:off x="0" y="0"/>
+          <a:ext cx="0" cy="0"/>
+          <a:chOff x="0" y="0"/>
+          <a:chExt cx="0" cy="0"/>
+        </a:xfrm>
+      </p:grpSpPr>
+      <p:pic>
+        <p:nvPicPr>
+          <p:cNvPr id="2" name="Imagen 1">
+            <a:extLst>
+              <a:ext uri="{FF2B5EF4-FFF2-40B4-BE49-F238E27FC236}">
+                <a16:creationId xmlns:a16="http://schemas.microsoft.com/office/drawing/2014/main" id="{72573269-02E0-0C98-F611-BB89CFB3C11D}"/>
+              </a:ext>
+            </a:extLst>
+          </p:cNvPr>
+          <p:cNvPicPr>
+            <a:picLocks noChangeAspect="1"/>
+          </p:cNvPicPr>
+          <p:nvPr/>
+        </p:nvPicPr>
+        <p:blipFill rotWithShape="1">
+          <a:blip r:embed="rId2">
+            <a:extLst>
+              <a:ext uri="{BEBA8EAE-BF5A-486C-A8C5-ECC9F3942E4B}">
+                <a14:imgProps xmlns:a14="http://schemas.microsoft.com/office/drawing/2010/main">
+                  <a14:imgLayer r:embed="rId3">
+                    <a14:imgEffect>
+                      <a14:brightnessContrast bright="20000"/>
+                    </a14:imgEffect>
+                  </a14:imgLayer>
+                </a14:imgProps>
+              </a:ext>
+              <a:ext uri="{28A0092B-C50C-407E-A947-70E740481C1C}">
+                <a14:useLocalDpi xmlns:a14="http://schemas.microsoft.com/office/drawing/2010/main" val="0"/>
+              </a:ext>
+            </a:extLst>
+          </a:blip>
+          <a:srcRect b="9326"/>
+          <a:stretch/>
+        </p:blipFill>
+        <p:spPr>
+          <a:xfrm>
+            <a:off x="20680" y="4"/>
+            <a:ext cx="35979058" cy="8388346"/>
+          </a:xfrm>
+          <a:prstGeom prst="rect">
+            <a:avLst/>
+          </a:prstGeom>
+          <a:effectLst/>
+        </p:spPr>
+      </p:pic>
+      <p:sp>
+        <p:nvSpPr>
+          <p:cNvPr id="3" name="CuadroTexto 7">
+            <a:extLst>
+              <a:ext uri="{FF2B5EF4-FFF2-40B4-BE49-F238E27FC236}">
+                <a16:creationId xmlns:a16="http://schemas.microsoft.com/office/drawing/2014/main" id="{2B441524-FD7B-6CCC-7A75-98E140C8307B}"/>
+              </a:ext>
+            </a:extLst>
+          </p:cNvPr>
+          <p:cNvSpPr txBox="1"/>
+          <p:nvPr/>
+        </p:nvSpPr>
+        <p:spPr>
+          <a:xfrm>
+            <a:off x="0" y="0"/>
+            <a:ext cx="35979058" cy="8633133"/>
+          </a:xfrm>
+          <a:prstGeom prst="rect">
+            <a:avLst/>
+          </a:prstGeom>
+          <a:noFill/>
+        </p:spPr>
+        <p:txBody>
+          <a:bodyPr wrap="square" rtlCol="0">
+            <a:spAutoFit/>
+            <a:scene3d>
+              <a:camera prst="orthographicFront"/>
+              <a:lightRig rig="threePt" dir="t"/>
+            </a:scene3d>
+            <a:sp3d extrusionH="57150">
+              <a:bevelT h="25400" prst="softRound"/>
+            </a:sp3d>
+          </a:bodyPr>
+          <a:lstStyle/>
+          <a:p>
+            <a:pPr algn="ctr" fontAlgn="base">
+              <a:spcAft>
+                <a:spcPts val="1800"/>
+              </a:spcAft>
+            </a:pPr>
+            <a:r>
+              <a:rPr lang="es-MX" sz="27000" b="1" i="1" kern="100" spc="300" dirty="0">
+                <a:solidFill>
+                  <a:srgbClr val="CC0000"/>
+                </a:solidFill>
+                <a:effectLst>
+                  <a:glow rad="114300">
+                    <a:schemeClr val="bg1"/>
+                  </a:glow>
+                  <a:outerShdw blurRad="50800" dist="38100" dir="2700000" algn="tl">
+                    <a:srgbClr val="000000">
+                      <a:alpha val="40000"/>
+                    </a:srgbClr>
+                  </a:outerShdw>
+                </a:effectLst>
+                <a:latin typeface="Book Antiqua" panose="02040602050305030304" pitchFamily="18" charset="0"/>
+              </a:rPr>
+              <a:t>Se esta cargando el</a:t>
+            </a:r>
+          </a:p>
+          <a:p>
+            <a:pPr algn="ctr" fontAlgn="base">
+              <a:spcAft>
+                <a:spcPts val="1800"/>
+              </a:spcAft>
+            </a:pPr>
+            <a:r>
+              <a:rPr lang="es-MX" sz="27000" b="1" i="1" kern="100" spc="300" dirty="0">
+                <a:solidFill>
+                  <a:srgbClr val="CC0000"/>
+                </a:solidFill>
+                <a:effectLst>
+                  <a:glow rad="114300">
+                    <a:schemeClr val="bg1"/>
+                  </a:glow>
+                  <a:outerShdw blurRad="50800" dist="38100" dir="2700000" algn="tl">
+                    <a:srgbClr val="000000">
+                      <a:alpha val="40000"/>
+                    </a:srgbClr>
+                  </a:outerShdw>
+                </a:effectLst>
+                <a:latin typeface="Book Antiqua" panose="02040602050305030304" pitchFamily="18" charset="0"/>
+              </a:rPr>
+              <a:t>video del devocional</a:t>
+            </a:r>
+            <a:endParaRPr lang="es-419" sz="27000" kern="100" spc="300" dirty="0">
+              <a:effectLst>
+                <a:glow rad="114300">
+                  <a:schemeClr val="bg1"/>
+                </a:glow>
+              </a:effectLst>
+              <a:latin typeface="Calibri" panose="020F0502020204030204" pitchFamily="34" charset="0"/>
+              <a:ea typeface="Calibri" panose="020F0502020204030204" pitchFamily="34" charset="0"/>
+              <a:cs typeface="Times New Roman" panose="02020603050405020304" pitchFamily="18" charset="0"/>
+            </a:endParaRPr>
+          </a:p>
+        </p:txBody>
+      </p:sp>
+    </p:spTree>
+    <p:extLst>
+      <p:ext uri="{BB962C8B-B14F-4D97-AF65-F5344CB8AC3E}">
+        <p14:creationId xmlns:p14="http://schemas.microsoft.com/office/powerpoint/2010/main" val="1264785830"/>
+      </p:ext>
+    </p:extLst>
+  </p:cSld>
+  <p:clrMapOvr>
+    <a:masterClrMapping/>
+  </p:clrMapOvr>
+</p:sld>
+</file>
+
 <file path=ppt/theme/theme1.xml><?xml version="1.0" encoding="utf-8"?>
 <a:theme xmlns:a="http://schemas.openxmlformats.org/drawingml/2006/main" name="Tema de Office">
   <a:themeElements>

</xml_diff>